<commit_message>
Added start on boot commands
</commit_message>
<xml_diff>
--- a/Chapter 01 - Setting up your Docker Environment.pptx
+++ b/Chapter 01 - Setting up your Docker Environment.pptx
@@ -202,7 +202,7 @@
           <a:noFill/>
           <a:extLst>
             <a:ext uri="{909E8E84-426E-40dd-AFC4-6F175D3DCCD1}">
-              <a14:hiddenFill xmlns:a14="http://schemas.microsoft.com/office/drawing/2010/main" xmlns="">
+              <a14:hiddenFill xmlns="" xmlns:a14="http://schemas.microsoft.com/office/drawing/2010/main">
                 <a:solidFill>
                   <a:srgbClr val="FFFFFF"/>
                 </a:solidFill>
@@ -261,7 +261,7 @@
             </a:ln>
             <a:extLst>
               <a:ext uri="{91240B29-F687-4f45-9708-019B960494DF}">
-                <a14:hiddenLine xmlns:a14="http://schemas.microsoft.com/office/drawing/2010/main" xmlns="" w="9525">
+                <a14:hiddenLine xmlns="" xmlns:a14="http://schemas.microsoft.com/office/drawing/2010/main" w="9525">
                   <a:solidFill>
                     <a:srgbClr val="000000"/>
                   </a:solidFill>
@@ -351,7 +351,7 @@
             </a:ln>
             <a:extLst>
               <a:ext uri="{91240B29-F687-4f45-9708-019B960494DF}">
-                <a14:hiddenLine xmlns:a14="http://schemas.microsoft.com/office/drawing/2010/main" xmlns="" w="9525">
+                <a14:hiddenLine xmlns="" xmlns:a14="http://schemas.microsoft.com/office/drawing/2010/main" w="9525">
                   <a:solidFill>
                     <a:srgbClr val="000000"/>
                   </a:solidFill>
@@ -441,7 +441,7 @@
             </a:ln>
             <a:extLst>
               <a:ext uri="{91240B29-F687-4f45-9708-019B960494DF}">
-                <a14:hiddenLine xmlns:a14="http://schemas.microsoft.com/office/drawing/2010/main" xmlns="" w="9525">
+                <a14:hiddenLine xmlns="" xmlns:a14="http://schemas.microsoft.com/office/drawing/2010/main" w="9525">
                   <a:solidFill>
                     <a:srgbClr val="000000"/>
                   </a:solidFill>
@@ -475,7 +475,7 @@
             </a:ln>
             <a:extLst>
               <a:ext uri="{91240B29-F687-4f45-9708-019B960494DF}">
-                <a14:hiddenLine xmlns:a14="http://schemas.microsoft.com/office/drawing/2010/main" xmlns="" w="9525">
+                <a14:hiddenLine xmlns="" xmlns:a14="http://schemas.microsoft.com/office/drawing/2010/main" w="9525">
                   <a:solidFill>
                     <a:srgbClr val="000000"/>
                   </a:solidFill>
@@ -565,7 +565,7 @@
             </a:ln>
             <a:extLst>
               <a:ext uri="{91240B29-F687-4f45-9708-019B960494DF}">
-                <a14:hiddenLine xmlns:a14="http://schemas.microsoft.com/office/drawing/2010/main" xmlns="" w="9525">
+                <a14:hiddenLine xmlns="" xmlns:a14="http://schemas.microsoft.com/office/drawing/2010/main" w="9525">
                   <a:solidFill>
                     <a:srgbClr val="000000"/>
                   </a:solidFill>
@@ -627,7 +627,7 @@
             </a:ln>
             <a:extLst>
               <a:ext uri="{91240B29-F687-4f45-9708-019B960494DF}">
-                <a14:hiddenLine xmlns:a14="http://schemas.microsoft.com/office/drawing/2010/main" xmlns="" w="9525">
+                <a14:hiddenLine xmlns="" xmlns:a14="http://schemas.microsoft.com/office/drawing/2010/main" w="9525">
                   <a:solidFill>
                     <a:srgbClr val="000000"/>
                   </a:solidFill>
@@ -689,7 +689,7 @@
             </a:ln>
             <a:extLst>
               <a:ext uri="{91240B29-F687-4f45-9708-019B960494DF}">
-                <a14:hiddenLine xmlns:a14="http://schemas.microsoft.com/office/drawing/2010/main" xmlns="" w="9525">
+                <a14:hiddenLine xmlns="" xmlns:a14="http://schemas.microsoft.com/office/drawing/2010/main" w="9525">
                   <a:solidFill>
                     <a:srgbClr val="000000"/>
                   </a:solidFill>
@@ -779,7 +779,7 @@
             </a:ln>
             <a:extLst>
               <a:ext uri="{91240B29-F687-4f45-9708-019B960494DF}">
-                <a14:hiddenLine xmlns:a14="http://schemas.microsoft.com/office/drawing/2010/main" xmlns="" w="9525">
+                <a14:hiddenLine xmlns="" xmlns:a14="http://schemas.microsoft.com/office/drawing/2010/main" w="9525">
                   <a:solidFill>
                     <a:srgbClr val="000000"/>
                   </a:solidFill>
@@ -841,7 +841,7 @@
             </a:ln>
             <a:extLst>
               <a:ext uri="{91240B29-F687-4f45-9708-019B960494DF}">
-                <a14:hiddenLine xmlns:a14="http://schemas.microsoft.com/office/drawing/2010/main" xmlns="" w="9525">
+                <a14:hiddenLine xmlns="" xmlns:a14="http://schemas.microsoft.com/office/drawing/2010/main" w="9525">
                   <a:solidFill>
                     <a:srgbClr val="000000"/>
                   </a:solidFill>
@@ -903,7 +903,7 @@
             </a:ln>
             <a:extLst>
               <a:ext uri="{91240B29-F687-4f45-9708-019B960494DF}">
-                <a14:hiddenLine xmlns:a14="http://schemas.microsoft.com/office/drawing/2010/main" xmlns="" w="9525">
+                <a14:hiddenLine xmlns="" xmlns:a14="http://schemas.microsoft.com/office/drawing/2010/main" w="9525">
                   <a:solidFill>
                     <a:srgbClr val="000000"/>
                   </a:solidFill>
@@ -993,7 +993,7 @@
             </a:ln>
             <a:extLst>
               <a:ext uri="{91240B29-F687-4f45-9708-019B960494DF}">
-                <a14:hiddenLine xmlns:a14="http://schemas.microsoft.com/office/drawing/2010/main" xmlns="" w="9525">
+                <a14:hiddenLine xmlns="" xmlns:a14="http://schemas.microsoft.com/office/drawing/2010/main" w="9525">
                   <a:solidFill>
                     <a:srgbClr val="000000"/>
                   </a:solidFill>
@@ -1083,7 +1083,7 @@
             </a:ln>
             <a:extLst>
               <a:ext uri="{91240B29-F687-4f45-9708-019B960494DF}">
-                <a14:hiddenLine xmlns:a14="http://schemas.microsoft.com/office/drawing/2010/main" xmlns="" w="9525">
+                <a14:hiddenLine xmlns="" xmlns:a14="http://schemas.microsoft.com/office/drawing/2010/main" w="9525">
                   <a:solidFill>
                     <a:srgbClr val="000000"/>
                   </a:solidFill>
@@ -1145,7 +1145,7 @@
             </a:ln>
             <a:extLst>
               <a:ext uri="{91240B29-F687-4f45-9708-019B960494DF}">
-                <a14:hiddenLine xmlns:a14="http://schemas.microsoft.com/office/drawing/2010/main" xmlns="" w="9525">
+                <a14:hiddenLine xmlns="" xmlns:a14="http://schemas.microsoft.com/office/drawing/2010/main" w="9525">
                   <a:solidFill>
                     <a:srgbClr val="000000"/>
                   </a:solidFill>
@@ -1255,7 +1255,7 @@
             </a:ln>
             <a:extLst>
               <a:ext uri="{91240B29-F687-4f45-9708-019B960494DF}">
-                <a14:hiddenLine xmlns:a14="http://schemas.microsoft.com/office/drawing/2010/main" xmlns="" w="9525">
+                <a14:hiddenLine xmlns="" xmlns:a14="http://schemas.microsoft.com/office/drawing/2010/main" w="9525">
                   <a:solidFill>
                     <a:srgbClr val="000000"/>
                   </a:solidFill>
@@ -1317,7 +1317,7 @@
             </a:ln>
             <a:extLst>
               <a:ext uri="{91240B29-F687-4f45-9708-019B960494DF}">
-                <a14:hiddenLine xmlns:a14="http://schemas.microsoft.com/office/drawing/2010/main" xmlns="" w="9525">
+                <a14:hiddenLine xmlns="" xmlns:a14="http://schemas.microsoft.com/office/drawing/2010/main" w="9525">
                   <a:solidFill>
                     <a:srgbClr val="000000"/>
                   </a:solidFill>
@@ -1407,7 +1407,7 @@
             </a:ln>
             <a:extLst>
               <a:ext uri="{91240B29-F687-4f45-9708-019B960494DF}">
-                <a14:hiddenLine xmlns:a14="http://schemas.microsoft.com/office/drawing/2010/main" xmlns="" w="9525">
+                <a14:hiddenLine xmlns="" xmlns:a14="http://schemas.microsoft.com/office/drawing/2010/main" w="9525">
                   <a:solidFill>
                     <a:srgbClr val="000000"/>
                   </a:solidFill>
@@ -1497,7 +1497,7 @@
             </a:ln>
             <a:extLst>
               <a:ext uri="{91240B29-F687-4f45-9708-019B960494DF}">
-                <a14:hiddenLine xmlns:a14="http://schemas.microsoft.com/office/drawing/2010/main" xmlns="" w="9525">
+                <a14:hiddenLine xmlns="" xmlns:a14="http://schemas.microsoft.com/office/drawing/2010/main" w="9525">
                   <a:solidFill>
                     <a:srgbClr val="000000"/>
                   </a:solidFill>
@@ -1559,7 +1559,7 @@
             </a:ln>
             <a:extLst>
               <a:ext uri="{91240B29-F687-4f45-9708-019B960494DF}">
-                <a14:hiddenLine xmlns:a14="http://schemas.microsoft.com/office/drawing/2010/main" xmlns="" w="9525">
+                <a14:hiddenLine xmlns="" xmlns:a14="http://schemas.microsoft.com/office/drawing/2010/main" w="9525">
                   <a:solidFill>
                     <a:srgbClr val="000000"/>
                   </a:solidFill>
@@ -1649,7 +1649,7 @@
             </a:ln>
             <a:extLst>
               <a:ext uri="{91240B29-F687-4f45-9708-019B960494DF}">
-                <a14:hiddenLine xmlns:a14="http://schemas.microsoft.com/office/drawing/2010/main" xmlns="" w="9525">
+                <a14:hiddenLine xmlns="" xmlns:a14="http://schemas.microsoft.com/office/drawing/2010/main" w="9525">
                   <a:solidFill>
                     <a:srgbClr val="000000"/>
                   </a:solidFill>
@@ -1739,7 +1739,7 @@
             </a:ln>
             <a:extLst>
               <a:ext uri="{91240B29-F687-4f45-9708-019B960494DF}">
-                <a14:hiddenLine xmlns:a14="http://schemas.microsoft.com/office/drawing/2010/main" xmlns="" w="9525">
+                <a14:hiddenLine xmlns="" xmlns:a14="http://schemas.microsoft.com/office/drawing/2010/main" w="9525">
                   <a:solidFill>
                     <a:srgbClr val="000000"/>
                   </a:solidFill>
@@ -1795,7 +1795,7 @@
             </a:ln>
             <a:extLst>
               <a:ext uri="{91240B29-F687-4f45-9708-019B960494DF}">
-                <a14:hiddenLine xmlns:a14="http://schemas.microsoft.com/office/drawing/2010/main" xmlns="" w="9525">
+                <a14:hiddenLine xmlns="" xmlns:a14="http://schemas.microsoft.com/office/drawing/2010/main" w="9525">
                   <a:solidFill>
                     <a:srgbClr val="000000"/>
                   </a:solidFill>
@@ -1885,7 +1885,7 @@
             </a:ln>
             <a:extLst>
               <a:ext uri="{91240B29-F687-4f45-9708-019B960494DF}">
-                <a14:hiddenLine xmlns:a14="http://schemas.microsoft.com/office/drawing/2010/main" xmlns="" w="9525">
+                <a14:hiddenLine xmlns="" xmlns:a14="http://schemas.microsoft.com/office/drawing/2010/main" w="9525">
                   <a:solidFill>
                     <a:srgbClr val="000000"/>
                   </a:solidFill>
@@ -1941,7 +1941,7 @@
             </a:ln>
             <a:extLst>
               <a:ext uri="{91240B29-F687-4f45-9708-019B960494DF}">
-                <a14:hiddenLine xmlns:a14="http://schemas.microsoft.com/office/drawing/2010/main" xmlns="" w="9525">
+                <a14:hiddenLine xmlns="" xmlns:a14="http://schemas.microsoft.com/office/drawing/2010/main" w="9525">
                   <a:solidFill>
                     <a:srgbClr val="000000"/>
                   </a:solidFill>
@@ -2031,7 +2031,7 @@
             </a:ln>
             <a:extLst>
               <a:ext uri="{91240B29-F687-4f45-9708-019B960494DF}">
-                <a14:hiddenLine xmlns:a14="http://schemas.microsoft.com/office/drawing/2010/main" xmlns="" w="9525">
+                <a14:hiddenLine xmlns="" xmlns:a14="http://schemas.microsoft.com/office/drawing/2010/main" w="9525">
                   <a:solidFill>
                     <a:srgbClr val="000000"/>
                   </a:solidFill>
@@ -2099,7 +2099,7 @@
             </a:ln>
             <a:extLst>
               <a:ext uri="{91240B29-F687-4f45-9708-019B960494DF}">
-                <a14:hiddenLine xmlns:a14="http://schemas.microsoft.com/office/drawing/2010/main" xmlns="" w="9525">
+                <a14:hiddenLine xmlns="" xmlns:a14="http://schemas.microsoft.com/office/drawing/2010/main" w="9525">
                   <a:solidFill>
                     <a:srgbClr val="000000"/>
                   </a:solidFill>
@@ -2189,7 +2189,7 @@
             </a:ln>
             <a:extLst>
               <a:ext uri="{91240B29-F687-4f45-9708-019B960494DF}">
-                <a14:hiddenLine xmlns:a14="http://schemas.microsoft.com/office/drawing/2010/main" xmlns="" w="9525">
+                <a14:hiddenLine xmlns="" xmlns:a14="http://schemas.microsoft.com/office/drawing/2010/main" w="9525">
                   <a:solidFill>
                     <a:srgbClr val="000000"/>
                   </a:solidFill>
@@ -2257,7 +2257,7 @@
             </a:ln>
             <a:extLst>
               <a:ext uri="{91240B29-F687-4f45-9708-019B960494DF}">
-                <a14:hiddenLine xmlns:a14="http://schemas.microsoft.com/office/drawing/2010/main" xmlns="" w="9525">
+                <a14:hiddenLine xmlns="" xmlns:a14="http://schemas.microsoft.com/office/drawing/2010/main" w="9525">
                   <a:solidFill>
                     <a:srgbClr val="000000"/>
                   </a:solidFill>
@@ -2347,7 +2347,7 @@
             </a:ln>
             <a:extLst>
               <a:ext uri="{91240B29-F687-4f45-9708-019B960494DF}">
-                <a14:hiddenLine xmlns:a14="http://schemas.microsoft.com/office/drawing/2010/main" xmlns="" w="9525">
+                <a14:hiddenLine xmlns="" xmlns:a14="http://schemas.microsoft.com/office/drawing/2010/main" w="9525">
                   <a:solidFill>
                     <a:srgbClr val="000000"/>
                   </a:solidFill>
@@ -2381,7 +2381,7 @@
             </a:ln>
             <a:extLst>
               <a:ext uri="{91240B29-F687-4f45-9708-019B960494DF}">
-                <a14:hiddenLine xmlns:a14="http://schemas.microsoft.com/office/drawing/2010/main" xmlns="" w="9525">
+                <a14:hiddenLine xmlns="" xmlns:a14="http://schemas.microsoft.com/office/drawing/2010/main" w="9525">
                   <a:solidFill>
                     <a:srgbClr val="000000"/>
                   </a:solidFill>
@@ -2471,7 +2471,7 @@
             </a:ln>
             <a:extLst>
               <a:ext uri="{91240B29-F687-4f45-9708-019B960494DF}">
-                <a14:hiddenLine xmlns:a14="http://schemas.microsoft.com/office/drawing/2010/main" xmlns="" w="9525">
+                <a14:hiddenLine xmlns="" xmlns:a14="http://schemas.microsoft.com/office/drawing/2010/main" w="9525">
                   <a:solidFill>
                     <a:srgbClr val="000000"/>
                   </a:solidFill>
@@ -2533,7 +2533,7 @@
             </a:ln>
             <a:extLst>
               <a:ext uri="{91240B29-F687-4f45-9708-019B960494DF}">
-                <a14:hiddenLine xmlns:a14="http://schemas.microsoft.com/office/drawing/2010/main" xmlns="" w="9525">
+                <a14:hiddenLine xmlns="" xmlns:a14="http://schemas.microsoft.com/office/drawing/2010/main" w="9525">
                   <a:solidFill>
                     <a:srgbClr val="000000"/>
                   </a:solidFill>
@@ -2595,7 +2595,7 @@
             </a:ln>
             <a:extLst>
               <a:ext uri="{91240B29-F687-4f45-9708-019B960494DF}">
-                <a14:hiddenLine xmlns:a14="http://schemas.microsoft.com/office/drawing/2010/main" xmlns="" w="9525">
+                <a14:hiddenLine xmlns="" xmlns:a14="http://schemas.microsoft.com/office/drawing/2010/main" w="9525">
                   <a:solidFill>
                     <a:srgbClr val="000000"/>
                   </a:solidFill>
@@ -2685,7 +2685,7 @@
             </a:ln>
             <a:extLst>
               <a:ext uri="{91240B29-F687-4f45-9708-019B960494DF}">
-                <a14:hiddenLine xmlns:a14="http://schemas.microsoft.com/office/drawing/2010/main" xmlns="" w="9525">
+                <a14:hiddenLine xmlns="" xmlns:a14="http://schemas.microsoft.com/office/drawing/2010/main" w="9525">
                   <a:solidFill>
                     <a:srgbClr val="000000"/>
                   </a:solidFill>
@@ -2753,7 +2753,7 @@
             </a:ln>
             <a:extLst>
               <a:ext uri="{91240B29-F687-4f45-9708-019B960494DF}">
-                <a14:hiddenLine xmlns:a14="http://schemas.microsoft.com/office/drawing/2010/main" xmlns="" w="9525">
+                <a14:hiddenLine xmlns="" xmlns:a14="http://schemas.microsoft.com/office/drawing/2010/main" w="9525">
                   <a:solidFill>
                     <a:srgbClr val="000000"/>
                   </a:solidFill>
@@ -2815,7 +2815,7 @@
             </a:ln>
             <a:extLst>
               <a:ext uri="{91240B29-F687-4f45-9708-019B960494DF}">
-                <a14:hiddenLine xmlns:a14="http://schemas.microsoft.com/office/drawing/2010/main" xmlns="" w="9525">
+                <a14:hiddenLine xmlns="" xmlns:a14="http://schemas.microsoft.com/office/drawing/2010/main" w="9525">
                   <a:solidFill>
                     <a:srgbClr val="000000"/>
                   </a:solidFill>
@@ -2905,7 +2905,7 @@
             </a:ln>
             <a:extLst>
               <a:ext uri="{91240B29-F687-4f45-9708-019B960494DF}">
-                <a14:hiddenLine xmlns:a14="http://schemas.microsoft.com/office/drawing/2010/main" xmlns="" w="9525">
+                <a14:hiddenLine xmlns="" xmlns:a14="http://schemas.microsoft.com/office/drawing/2010/main" w="9525">
                   <a:solidFill>
                     <a:srgbClr val="000000"/>
                   </a:solidFill>
@@ -2967,7 +2967,7 @@
             </a:ln>
             <a:extLst>
               <a:ext uri="{91240B29-F687-4f45-9708-019B960494DF}">
-                <a14:hiddenLine xmlns:a14="http://schemas.microsoft.com/office/drawing/2010/main" xmlns="" w="9525">
+                <a14:hiddenLine xmlns="" xmlns:a14="http://schemas.microsoft.com/office/drawing/2010/main" w="9525">
                   <a:solidFill>
                     <a:srgbClr val="000000"/>
                   </a:solidFill>
@@ -3057,7 +3057,7 @@
             </a:ln>
             <a:extLst>
               <a:ext uri="{91240B29-F687-4f45-9708-019B960494DF}">
-                <a14:hiddenLine xmlns:a14="http://schemas.microsoft.com/office/drawing/2010/main" xmlns="" w="9525">
+                <a14:hiddenLine xmlns="" xmlns:a14="http://schemas.microsoft.com/office/drawing/2010/main" w="9525">
                   <a:solidFill>
                     <a:srgbClr val="000000"/>
                   </a:solidFill>
@@ -3119,7 +3119,7 @@
             </a:ln>
             <a:extLst>
               <a:ext uri="{91240B29-F687-4f45-9708-019B960494DF}">
-                <a14:hiddenLine xmlns:a14="http://schemas.microsoft.com/office/drawing/2010/main" xmlns="" w="9525">
+                <a14:hiddenLine xmlns="" xmlns:a14="http://schemas.microsoft.com/office/drawing/2010/main" w="9525">
                   <a:solidFill>
                     <a:srgbClr val="000000"/>
                   </a:solidFill>
@@ -3209,7 +3209,7 @@
             </a:ln>
             <a:extLst>
               <a:ext uri="{91240B29-F687-4f45-9708-019B960494DF}">
-                <a14:hiddenLine xmlns:a14="http://schemas.microsoft.com/office/drawing/2010/main" xmlns="" w="9525">
+                <a14:hiddenLine xmlns="" xmlns:a14="http://schemas.microsoft.com/office/drawing/2010/main" w="9525">
                   <a:solidFill>
                     <a:srgbClr val="000000"/>
                   </a:solidFill>
@@ -3243,7 +3243,7 @@
             </a:ln>
             <a:extLst>
               <a:ext uri="{91240B29-F687-4f45-9708-019B960494DF}">
-                <a14:hiddenLine xmlns:a14="http://schemas.microsoft.com/office/drawing/2010/main" xmlns="" w="9525">
+                <a14:hiddenLine xmlns="" xmlns:a14="http://schemas.microsoft.com/office/drawing/2010/main" w="9525">
                   <a:solidFill>
                     <a:srgbClr val="000000"/>
                   </a:solidFill>
@@ -3308,7 +3308,7 @@
             </a:ln>
             <a:extLst>
               <a:ext uri="{91240B29-F687-4f45-9708-019B960494DF}">
-                <a14:hiddenLine xmlns:a14="http://schemas.microsoft.com/office/drawing/2010/main" xmlns="" w="9525">
+                <a14:hiddenLine xmlns="" xmlns:a14="http://schemas.microsoft.com/office/drawing/2010/main" w="9525">
                   <a:solidFill>
                     <a:srgbClr val="000000"/>
                   </a:solidFill>
@@ -3398,7 +3398,7 @@
             </a:ln>
             <a:extLst>
               <a:ext uri="{91240B29-F687-4f45-9708-019B960494DF}">
-                <a14:hiddenLine xmlns:a14="http://schemas.microsoft.com/office/drawing/2010/main" xmlns="" w="9525">
+                <a14:hiddenLine xmlns="" xmlns:a14="http://schemas.microsoft.com/office/drawing/2010/main" w="9525">
                   <a:solidFill>
                     <a:srgbClr val="000000"/>
                   </a:solidFill>
@@ -3460,7 +3460,7 @@
             </a:ln>
             <a:extLst>
               <a:ext uri="{91240B29-F687-4f45-9708-019B960494DF}">
-                <a14:hiddenLine xmlns:a14="http://schemas.microsoft.com/office/drawing/2010/main" xmlns="" w="9525">
+                <a14:hiddenLine xmlns="" xmlns:a14="http://schemas.microsoft.com/office/drawing/2010/main" w="9525">
                   <a:solidFill>
                     <a:srgbClr val="000000"/>
                   </a:solidFill>
@@ -3550,7 +3550,7 @@
             </a:ln>
             <a:extLst>
               <a:ext uri="{91240B29-F687-4f45-9708-019B960494DF}">
-                <a14:hiddenLine xmlns:a14="http://schemas.microsoft.com/office/drawing/2010/main" xmlns="" w="9525">
+                <a14:hiddenLine xmlns="" xmlns:a14="http://schemas.microsoft.com/office/drawing/2010/main" w="9525">
                   <a:solidFill>
                     <a:srgbClr val="000000"/>
                   </a:solidFill>
@@ -3640,7 +3640,7 @@
             </a:ln>
             <a:extLst>
               <a:ext uri="{91240B29-F687-4f45-9708-019B960494DF}">
-                <a14:hiddenLine xmlns:a14="http://schemas.microsoft.com/office/drawing/2010/main" xmlns="" w="9525">
+                <a14:hiddenLine xmlns="" xmlns:a14="http://schemas.microsoft.com/office/drawing/2010/main" w="9525">
                   <a:solidFill>
                     <a:srgbClr val="000000"/>
                   </a:solidFill>
@@ -3705,7 +3705,7 @@
             </a:ln>
             <a:extLst>
               <a:ext uri="{91240B29-F687-4f45-9708-019B960494DF}">
-                <a14:hiddenLine xmlns:a14="http://schemas.microsoft.com/office/drawing/2010/main" xmlns="" w="9525">
+                <a14:hiddenLine xmlns="" xmlns:a14="http://schemas.microsoft.com/office/drawing/2010/main" w="9525">
                   <a:solidFill>
                     <a:srgbClr val="000000"/>
                   </a:solidFill>
@@ -3767,7 +3767,7 @@
             </a:ln>
             <a:extLst>
               <a:ext uri="{91240B29-F687-4f45-9708-019B960494DF}">
-                <a14:hiddenLine xmlns:a14="http://schemas.microsoft.com/office/drawing/2010/main" xmlns="" w="9525">
+                <a14:hiddenLine xmlns="" xmlns:a14="http://schemas.microsoft.com/office/drawing/2010/main" w="9525">
                   <a:solidFill>
                     <a:srgbClr val="000000"/>
                   </a:solidFill>
@@ -3857,7 +3857,7 @@
             </a:ln>
             <a:extLst>
               <a:ext uri="{91240B29-F687-4f45-9708-019B960494DF}">
-                <a14:hiddenLine xmlns:a14="http://schemas.microsoft.com/office/drawing/2010/main" xmlns="" w="9525">
+                <a14:hiddenLine xmlns="" xmlns:a14="http://schemas.microsoft.com/office/drawing/2010/main" w="9525">
                   <a:solidFill>
                     <a:srgbClr val="000000"/>
                   </a:solidFill>
@@ -3947,7 +3947,7 @@
             </a:ln>
             <a:extLst>
               <a:ext uri="{91240B29-F687-4f45-9708-019B960494DF}">
-                <a14:hiddenLine xmlns:a14="http://schemas.microsoft.com/office/drawing/2010/main" xmlns="" w="9525">
+                <a14:hiddenLine xmlns="" xmlns:a14="http://schemas.microsoft.com/office/drawing/2010/main" w="9525">
                   <a:solidFill>
                     <a:srgbClr val="000000"/>
                   </a:solidFill>
@@ -4009,7 +4009,7 @@
             </a:ln>
             <a:extLst>
               <a:ext uri="{91240B29-F687-4f45-9708-019B960494DF}">
-                <a14:hiddenLine xmlns:a14="http://schemas.microsoft.com/office/drawing/2010/main" xmlns="" w="9525">
+                <a14:hiddenLine xmlns="" xmlns:a14="http://schemas.microsoft.com/office/drawing/2010/main" w="9525">
                   <a:solidFill>
                     <a:srgbClr val="000000"/>
                   </a:solidFill>
@@ -4129,7 +4129,7 @@
             </a:ln>
             <a:extLst>
               <a:ext uri="{91240B29-F687-4f45-9708-019B960494DF}">
-                <a14:hiddenLine xmlns:a14="http://schemas.microsoft.com/office/drawing/2010/main" xmlns="" w="9525">
+                <a14:hiddenLine xmlns="" xmlns:a14="http://schemas.microsoft.com/office/drawing/2010/main" w="9525">
                   <a:solidFill>
                     <a:srgbClr val="000000"/>
                   </a:solidFill>
@@ -4197,7 +4197,7 @@
             </a:ln>
             <a:extLst>
               <a:ext uri="{91240B29-F687-4f45-9708-019B960494DF}">
-                <a14:hiddenLine xmlns:a14="http://schemas.microsoft.com/office/drawing/2010/main" xmlns="" w="9525">
+                <a14:hiddenLine xmlns="" xmlns:a14="http://schemas.microsoft.com/office/drawing/2010/main" w="9525">
                   <a:solidFill>
                     <a:srgbClr val="000000"/>
                   </a:solidFill>
@@ -4287,7 +4287,7 @@
             </a:ln>
             <a:extLst>
               <a:ext uri="{91240B29-F687-4f45-9708-019B960494DF}">
-                <a14:hiddenLine xmlns:a14="http://schemas.microsoft.com/office/drawing/2010/main" xmlns="" w="9525">
+                <a14:hiddenLine xmlns="" xmlns:a14="http://schemas.microsoft.com/office/drawing/2010/main" w="9525">
                   <a:solidFill>
                     <a:srgbClr val="000000"/>
                   </a:solidFill>
@@ -4427,7 +4427,7 @@
           <a:p>
             <a:fld id="{48A87A34-81AB-432B-8DAE-1953F412C126}" type="datetimeFigureOut">
               <a:rPr lang="en-US" dirty="0"/>
-              <a:t>9/7/2021</a:t>
+              <a:t>9/9/2021</a:t>
             </a:fld>
             <a:endParaRPr lang="en-US" dirty="0"/>
           </a:p>
@@ -4689,7 +4689,7 @@
           <a:p>
             <a:fld id="{48A87A34-81AB-432B-8DAE-1953F412C126}" type="datetimeFigureOut">
               <a:rPr lang="en-US" dirty="0"/>
-              <a:t>9/7/2021</a:t>
+              <a:t>9/9/2021</a:t>
             </a:fld>
             <a:endParaRPr lang="en-US" dirty="0"/>
           </a:p>
@@ -4880,7 +4880,7 @@
           <a:p>
             <a:fld id="{48A87A34-81AB-432B-8DAE-1953F412C126}" type="datetimeFigureOut">
               <a:rPr lang="en-US" dirty="0"/>
-              <a:t>9/7/2021</a:t>
+              <a:t>9/9/2021</a:t>
             </a:fld>
             <a:endParaRPr lang="en-US" dirty="0"/>
           </a:p>
@@ -5138,7 +5138,7 @@
           <a:p>
             <a:fld id="{48A87A34-81AB-432B-8DAE-1953F412C126}" type="datetimeFigureOut">
               <a:rPr lang="en-US" dirty="0"/>
-              <a:t>9/7/2021</a:t>
+              <a:t>9/9/2021</a:t>
             </a:fld>
             <a:endParaRPr lang="en-US" dirty="0"/>
           </a:p>
@@ -5567,7 +5567,7 @@
           <a:p>
             <a:fld id="{48A87A34-81AB-432B-8DAE-1953F412C126}" type="datetimeFigureOut">
               <a:rPr lang="en-US" dirty="0"/>
-              <a:t>9/7/2021</a:t>
+              <a:t>9/9/2021</a:t>
             </a:fld>
             <a:endParaRPr lang="en-US" dirty="0"/>
           </a:p>
@@ -6108,7 +6108,7 @@
           <a:p>
             <a:fld id="{48A87A34-81AB-432B-8DAE-1953F412C126}" type="datetimeFigureOut">
               <a:rPr lang="en-US" dirty="0"/>
-              <a:t>9/7/2021</a:t>
+              <a:t>9/9/2021</a:t>
             </a:fld>
             <a:endParaRPr lang="en-US" dirty="0"/>
           </a:p>
@@ -6823,7 +6823,7 @@
           <a:p>
             <a:fld id="{48A87A34-81AB-432B-8DAE-1953F412C126}" type="datetimeFigureOut">
               <a:rPr lang="en-US" dirty="0"/>
-              <a:t>9/7/2021</a:t>
+              <a:t>9/9/2021</a:t>
             </a:fld>
             <a:endParaRPr lang="en-US" dirty="0"/>
           </a:p>
@@ -6988,7 +6988,7 @@
           <a:p>
             <a:fld id="{48A87A34-81AB-432B-8DAE-1953F412C126}" type="datetimeFigureOut">
               <a:rPr lang="en-US" dirty="0"/>
-              <a:t>9/7/2021</a:t>
+              <a:t>9/9/2021</a:t>
             </a:fld>
             <a:endParaRPr lang="en-US" dirty="0"/>
           </a:p>
@@ -7163,7 +7163,7 @@
           <a:p>
             <a:fld id="{48A87A34-81AB-432B-8DAE-1953F412C126}" type="datetimeFigureOut">
               <a:rPr lang="en-US" dirty="0"/>
-              <a:t>9/7/2021</a:t>
+              <a:t>9/9/2021</a:t>
             </a:fld>
             <a:endParaRPr lang="en-US" dirty="0"/>
           </a:p>
@@ -7328,7 +7328,7 @@
           <a:p>
             <a:fld id="{48A87A34-81AB-432B-8DAE-1953F412C126}" type="datetimeFigureOut">
               <a:rPr lang="en-US" dirty="0"/>
-              <a:t>9/7/2021</a:t>
+              <a:t>9/9/2021</a:t>
             </a:fld>
             <a:endParaRPr lang="en-US" dirty="0"/>
           </a:p>
@@ -7573,7 +7573,7 @@
           <a:p>
             <a:fld id="{48A87A34-81AB-432B-8DAE-1953F412C126}" type="datetimeFigureOut">
               <a:rPr lang="en-US" dirty="0"/>
-              <a:t>9/7/2021</a:t>
+              <a:t>9/9/2021</a:t>
             </a:fld>
             <a:endParaRPr lang="en-US" dirty="0"/>
           </a:p>
@@ -7800,7 +7800,7 @@
           <a:p>
             <a:fld id="{48A87A34-81AB-432B-8DAE-1953F412C126}" type="datetimeFigureOut">
               <a:rPr lang="en-US" dirty="0"/>
-              <a:t>9/7/2021</a:t>
+              <a:t>9/9/2021</a:t>
             </a:fld>
             <a:endParaRPr lang="en-US" dirty="0"/>
           </a:p>
@@ -8176,7 +8176,7 @@
           <a:p>
             <a:fld id="{48A87A34-81AB-432B-8DAE-1953F412C126}" type="datetimeFigureOut">
               <a:rPr lang="en-US" dirty="0"/>
-              <a:t>9/7/2021</a:t>
+              <a:t>9/9/2021</a:t>
             </a:fld>
             <a:endParaRPr lang="en-US" dirty="0"/>
           </a:p>
@@ -8289,7 +8289,7 @@
           <a:p>
             <a:fld id="{48A87A34-81AB-432B-8DAE-1953F412C126}" type="datetimeFigureOut">
               <a:rPr lang="en-US" dirty="0"/>
-              <a:t>9/7/2021</a:t>
+              <a:t>9/9/2021</a:t>
             </a:fld>
             <a:endParaRPr lang="en-US" dirty="0"/>
           </a:p>
@@ -8379,7 +8379,7 @@
           <a:p>
             <a:fld id="{48A87A34-81AB-432B-8DAE-1953F412C126}" type="datetimeFigureOut">
               <a:rPr lang="en-US" dirty="0"/>
-              <a:t>9/7/2021</a:t>
+              <a:t>9/9/2021</a:t>
             </a:fld>
             <a:endParaRPr lang="en-US" dirty="0"/>
           </a:p>
@@ -8623,7 +8623,7 @@
           <a:p>
             <a:fld id="{48A87A34-81AB-432B-8DAE-1953F412C126}" type="datetimeFigureOut">
               <a:rPr lang="en-US" dirty="0"/>
-              <a:t>9/7/2021</a:t>
+              <a:t>9/9/2021</a:t>
             </a:fld>
             <a:endParaRPr lang="en-US" dirty="0"/>
           </a:p>
@@ -8898,7 +8898,7 @@
           <a:p>
             <a:fld id="{48A87A34-81AB-432B-8DAE-1953F412C126}" type="datetimeFigureOut">
               <a:rPr lang="en-US" dirty="0"/>
-              <a:t>9/7/2021</a:t>
+              <a:t>9/9/2021</a:t>
             </a:fld>
             <a:endParaRPr lang="en-US" dirty="0"/>
           </a:p>
@@ -9016,7 +9016,7 @@
           <a:noFill/>
           <a:extLst>
             <a:ext uri="{909E8E84-426E-40dd-AFC4-6F175D3DCCD1}">
-              <a14:hiddenFill xmlns:a14="http://schemas.microsoft.com/office/drawing/2010/main" xmlns="">
+              <a14:hiddenFill xmlns="" xmlns:a14="http://schemas.microsoft.com/office/drawing/2010/main">
                 <a:solidFill>
                   <a:srgbClr val="FFFFFF"/>
                 </a:solidFill>
@@ -9090,7 +9090,7 @@
               </a:ln>
               <a:extLst>
                 <a:ext uri="{91240B29-F687-4f45-9708-019B960494DF}">
-                  <a14:hiddenLine xmlns:a14="http://schemas.microsoft.com/office/drawing/2010/main" xmlns="" w="9525">
+                  <a14:hiddenLine xmlns="" xmlns:a14="http://schemas.microsoft.com/office/drawing/2010/main" w="9525">
                     <a:solidFill>
                       <a:srgbClr val="000000"/>
                     </a:solidFill>
@@ -9180,7 +9180,7 @@
               </a:ln>
               <a:extLst>
                 <a:ext uri="{91240B29-F687-4f45-9708-019B960494DF}">
-                  <a14:hiddenLine xmlns:a14="http://schemas.microsoft.com/office/drawing/2010/main" xmlns="" w="9525">
+                  <a14:hiddenLine xmlns="" xmlns:a14="http://schemas.microsoft.com/office/drawing/2010/main" w="9525">
                     <a:solidFill>
                       <a:srgbClr val="000000"/>
                     </a:solidFill>
@@ -9270,7 +9270,7 @@
               </a:ln>
               <a:extLst>
                 <a:ext uri="{91240B29-F687-4f45-9708-019B960494DF}">
-                  <a14:hiddenLine xmlns:a14="http://schemas.microsoft.com/office/drawing/2010/main" xmlns="" w="9525">
+                  <a14:hiddenLine xmlns="" xmlns:a14="http://schemas.microsoft.com/office/drawing/2010/main" w="9525">
                     <a:solidFill>
                       <a:srgbClr val="000000"/>
                     </a:solidFill>
@@ -9332,7 +9332,7 @@
               </a:ln>
               <a:extLst>
                 <a:ext uri="{91240B29-F687-4f45-9708-019B960494DF}">
-                  <a14:hiddenLine xmlns:a14="http://schemas.microsoft.com/office/drawing/2010/main" xmlns="" w="9525">
+                  <a14:hiddenLine xmlns="" xmlns:a14="http://schemas.microsoft.com/office/drawing/2010/main" w="9525">
                     <a:solidFill>
                       <a:srgbClr val="000000"/>
                     </a:solidFill>
@@ -9422,7 +9422,7 @@
               </a:ln>
               <a:extLst>
                 <a:ext uri="{91240B29-F687-4f45-9708-019B960494DF}">
-                  <a14:hiddenLine xmlns:a14="http://schemas.microsoft.com/office/drawing/2010/main" xmlns="" w="9525">
+                  <a14:hiddenLine xmlns="" xmlns:a14="http://schemas.microsoft.com/office/drawing/2010/main" w="9525">
                     <a:solidFill>
                       <a:srgbClr val="000000"/>
                     </a:solidFill>
@@ -9484,7 +9484,7 @@
               </a:ln>
               <a:extLst>
                 <a:ext uri="{91240B29-F687-4f45-9708-019B960494DF}">
-                  <a14:hiddenLine xmlns:a14="http://schemas.microsoft.com/office/drawing/2010/main" xmlns="" w="9525">
+                  <a14:hiddenLine xmlns="" xmlns:a14="http://schemas.microsoft.com/office/drawing/2010/main" w="9525">
                     <a:solidFill>
                       <a:srgbClr val="000000"/>
                     </a:solidFill>
@@ -9546,7 +9546,7 @@
               </a:ln>
               <a:extLst>
                 <a:ext uri="{91240B29-F687-4f45-9708-019B960494DF}">
-                  <a14:hiddenLine xmlns:a14="http://schemas.microsoft.com/office/drawing/2010/main" xmlns="" w="9525">
+                  <a14:hiddenLine xmlns="" xmlns:a14="http://schemas.microsoft.com/office/drawing/2010/main" w="9525">
                     <a:solidFill>
                       <a:srgbClr val="000000"/>
                     </a:solidFill>
@@ -9636,7 +9636,7 @@
               </a:ln>
               <a:extLst>
                 <a:ext uri="{91240B29-F687-4f45-9708-019B960494DF}">
-                  <a14:hiddenLine xmlns:a14="http://schemas.microsoft.com/office/drawing/2010/main" xmlns="" w="9525">
+                  <a14:hiddenLine xmlns="" xmlns:a14="http://schemas.microsoft.com/office/drawing/2010/main" w="9525">
                     <a:solidFill>
                       <a:srgbClr val="000000"/>
                     </a:solidFill>
@@ -9726,7 +9726,7 @@
               </a:ln>
               <a:extLst>
                 <a:ext uri="{91240B29-F687-4f45-9708-019B960494DF}">
-                  <a14:hiddenLine xmlns:a14="http://schemas.microsoft.com/office/drawing/2010/main" xmlns="" w="9525">
+                  <a14:hiddenLine xmlns="" xmlns:a14="http://schemas.microsoft.com/office/drawing/2010/main" w="9525">
                     <a:solidFill>
                       <a:srgbClr val="000000"/>
                     </a:solidFill>
@@ -9788,7 +9788,7 @@
               </a:ln>
               <a:extLst>
                 <a:ext uri="{91240B29-F687-4f45-9708-019B960494DF}">
-                  <a14:hiddenLine xmlns:a14="http://schemas.microsoft.com/office/drawing/2010/main" xmlns="" w="9525">
+                  <a14:hiddenLine xmlns="" xmlns:a14="http://schemas.microsoft.com/office/drawing/2010/main" w="9525">
                     <a:solidFill>
                       <a:srgbClr val="000000"/>
                     </a:solidFill>
@@ -9898,7 +9898,7 @@
               </a:ln>
               <a:extLst>
                 <a:ext uri="{91240B29-F687-4f45-9708-019B960494DF}">
-                  <a14:hiddenLine xmlns:a14="http://schemas.microsoft.com/office/drawing/2010/main" xmlns="" w="9525">
+                  <a14:hiddenLine xmlns="" xmlns:a14="http://schemas.microsoft.com/office/drawing/2010/main" w="9525">
                     <a:solidFill>
                       <a:srgbClr val="000000"/>
                     </a:solidFill>
@@ -9982,7 +9982,7 @@
               </a:ln>
               <a:extLst>
                 <a:ext uri="{91240B29-F687-4f45-9708-019B960494DF}">
-                  <a14:hiddenLine xmlns:a14="http://schemas.microsoft.com/office/drawing/2010/main" xmlns="" w="9525">
+                  <a14:hiddenLine xmlns="" xmlns:a14="http://schemas.microsoft.com/office/drawing/2010/main" w="9525">
                     <a:solidFill>
                       <a:srgbClr val="000000"/>
                     </a:solidFill>
@@ -10044,7 +10044,7 @@
               </a:ln>
               <a:extLst>
                 <a:ext uri="{91240B29-F687-4f45-9708-019B960494DF}">
-                  <a14:hiddenLine xmlns:a14="http://schemas.microsoft.com/office/drawing/2010/main" xmlns="" w="9525">
+                  <a14:hiddenLine xmlns="" xmlns:a14="http://schemas.microsoft.com/office/drawing/2010/main" w="9525">
                     <a:solidFill>
                       <a:srgbClr val="000000"/>
                     </a:solidFill>
@@ -10106,7 +10106,7 @@
               </a:ln>
               <a:extLst>
                 <a:ext uri="{91240B29-F687-4f45-9708-019B960494DF}">
-                  <a14:hiddenLine xmlns:a14="http://schemas.microsoft.com/office/drawing/2010/main" xmlns="" w="9525">
+                  <a14:hiddenLine xmlns="" xmlns:a14="http://schemas.microsoft.com/office/drawing/2010/main" w="9525">
                     <a:solidFill>
                       <a:srgbClr val="000000"/>
                     </a:solidFill>
@@ -10196,7 +10196,7 @@
               </a:ln>
               <a:extLst>
                 <a:ext uri="{91240B29-F687-4f45-9708-019B960494DF}">
-                  <a14:hiddenLine xmlns:a14="http://schemas.microsoft.com/office/drawing/2010/main" xmlns="" w="9525">
+                  <a14:hiddenLine xmlns="" xmlns:a14="http://schemas.microsoft.com/office/drawing/2010/main" w="9525">
                     <a:solidFill>
                       <a:srgbClr val="000000"/>
                     </a:solidFill>
@@ -10230,7 +10230,7 @@
               </a:ln>
               <a:extLst>
                 <a:ext uri="{91240B29-F687-4f45-9708-019B960494DF}">
-                  <a14:hiddenLine xmlns:a14="http://schemas.microsoft.com/office/drawing/2010/main" xmlns="" w="9525">
+                  <a14:hiddenLine xmlns="" xmlns:a14="http://schemas.microsoft.com/office/drawing/2010/main" w="9525">
                     <a:solidFill>
                       <a:srgbClr val="000000"/>
                     </a:solidFill>
@@ -10295,7 +10295,7 @@
               </a:ln>
               <a:extLst>
                 <a:ext uri="{91240B29-F687-4f45-9708-019B960494DF}">
-                  <a14:hiddenLine xmlns:a14="http://schemas.microsoft.com/office/drawing/2010/main" xmlns="" w="9525">
+                  <a14:hiddenLine xmlns="" xmlns:a14="http://schemas.microsoft.com/office/drawing/2010/main" w="9525">
                     <a:solidFill>
                       <a:srgbClr val="000000"/>
                     </a:solidFill>
@@ -10385,7 +10385,7 @@
               </a:ln>
               <a:extLst>
                 <a:ext uri="{91240B29-F687-4f45-9708-019B960494DF}">
-                  <a14:hiddenLine xmlns:a14="http://schemas.microsoft.com/office/drawing/2010/main" xmlns="" w="9525">
+                  <a14:hiddenLine xmlns="" xmlns:a14="http://schemas.microsoft.com/office/drawing/2010/main" w="9525">
                     <a:solidFill>
                       <a:srgbClr val="000000"/>
                     </a:solidFill>
@@ -10447,7 +10447,7 @@
               </a:ln>
               <a:extLst>
                 <a:ext uri="{91240B29-F687-4f45-9708-019B960494DF}">
-                  <a14:hiddenLine xmlns:a14="http://schemas.microsoft.com/office/drawing/2010/main" xmlns="" w="9525">
+                  <a14:hiddenLine xmlns="" xmlns:a14="http://schemas.microsoft.com/office/drawing/2010/main" w="9525">
                     <a:solidFill>
                       <a:srgbClr val="000000"/>
                     </a:solidFill>
@@ -10537,7 +10537,7 @@
               </a:ln>
               <a:extLst>
                 <a:ext uri="{91240B29-F687-4f45-9708-019B960494DF}">
-                  <a14:hiddenLine xmlns:a14="http://schemas.microsoft.com/office/drawing/2010/main" xmlns="" w="9525">
+                  <a14:hiddenLine xmlns="" xmlns:a14="http://schemas.microsoft.com/office/drawing/2010/main" w="9525">
                     <a:solidFill>
                       <a:srgbClr val="000000"/>
                     </a:solidFill>
@@ -10602,7 +10602,7 @@
               </a:ln>
               <a:extLst>
                 <a:ext uri="{91240B29-F687-4f45-9708-019B960494DF}">
-                  <a14:hiddenLine xmlns:a14="http://schemas.microsoft.com/office/drawing/2010/main" xmlns="" w="9525">
+                  <a14:hiddenLine xmlns="" xmlns:a14="http://schemas.microsoft.com/office/drawing/2010/main" w="9525">
                     <a:solidFill>
                       <a:srgbClr val="000000"/>
                     </a:solidFill>
@@ -10664,7 +10664,7 @@
               </a:ln>
               <a:extLst>
                 <a:ext uri="{91240B29-F687-4f45-9708-019B960494DF}">
-                  <a14:hiddenLine xmlns:a14="http://schemas.microsoft.com/office/drawing/2010/main" xmlns="" w="9525">
+                  <a14:hiddenLine xmlns="" xmlns:a14="http://schemas.microsoft.com/office/drawing/2010/main" w="9525">
                     <a:solidFill>
                       <a:srgbClr val="000000"/>
                     </a:solidFill>
@@ -10754,7 +10754,7 @@
               </a:ln>
               <a:extLst>
                 <a:ext uri="{91240B29-F687-4f45-9708-019B960494DF}">
-                  <a14:hiddenLine xmlns:a14="http://schemas.microsoft.com/office/drawing/2010/main" xmlns="" w="9525">
+                  <a14:hiddenLine xmlns="" xmlns:a14="http://schemas.microsoft.com/office/drawing/2010/main" w="9525">
                     <a:solidFill>
                       <a:srgbClr val="000000"/>
                     </a:solidFill>
@@ -10844,7 +10844,7 @@
               </a:ln>
               <a:extLst>
                 <a:ext uri="{91240B29-F687-4f45-9708-019B960494DF}">
-                  <a14:hiddenLine xmlns:a14="http://schemas.microsoft.com/office/drawing/2010/main" xmlns="" w="9525">
+                  <a14:hiddenLine xmlns="" xmlns:a14="http://schemas.microsoft.com/office/drawing/2010/main" w="9525">
                     <a:solidFill>
                       <a:srgbClr val="000000"/>
                     </a:solidFill>
@@ -10909,7 +10909,7 @@
               </a:ln>
               <a:extLst>
                 <a:ext uri="{91240B29-F687-4f45-9708-019B960494DF}">
-                  <a14:hiddenLine xmlns:a14="http://schemas.microsoft.com/office/drawing/2010/main" xmlns="" w="9525">
+                  <a14:hiddenLine xmlns="" xmlns:a14="http://schemas.microsoft.com/office/drawing/2010/main" w="9525">
                     <a:solidFill>
                       <a:srgbClr val="000000"/>
                     </a:solidFill>
@@ -11029,7 +11029,7 @@
               </a:ln>
               <a:extLst>
                 <a:ext uri="{91240B29-F687-4f45-9708-019B960494DF}">
-                  <a14:hiddenLine xmlns:a14="http://schemas.microsoft.com/office/drawing/2010/main" xmlns="" w="9525">
+                  <a14:hiddenLine xmlns="" xmlns:a14="http://schemas.microsoft.com/office/drawing/2010/main" w="9525">
                     <a:solidFill>
                       <a:srgbClr val="000000"/>
                     </a:solidFill>
@@ -11110,7 +11110,7 @@
               </a:ln>
               <a:extLst>
                 <a:ext uri="{91240B29-F687-4f45-9708-019B960494DF}">
-                  <a14:hiddenLine xmlns:a14="http://schemas.microsoft.com/office/drawing/2010/main" xmlns="" w="9525">
+                  <a14:hiddenLine xmlns="" xmlns:a14="http://schemas.microsoft.com/office/drawing/2010/main" w="9525">
                     <a:solidFill>
                       <a:srgbClr val="000000"/>
                     </a:solidFill>
@@ -11225,7 +11225,7 @@
               </a:ln>
               <a:extLst>
                 <a:ext uri="{91240B29-F687-4f45-9708-019B960494DF}">
-                  <a14:hiddenLine xmlns:a14="http://schemas.microsoft.com/office/drawing/2010/main" xmlns="" w="9525">
+                  <a14:hiddenLine xmlns="" xmlns:a14="http://schemas.microsoft.com/office/drawing/2010/main" w="9525">
                     <a:solidFill>
                       <a:srgbClr val="000000"/>
                     </a:solidFill>
@@ -11315,7 +11315,7 @@
               </a:ln>
               <a:extLst>
                 <a:ext uri="{91240B29-F687-4f45-9708-019B960494DF}">
-                  <a14:hiddenLine xmlns:a14="http://schemas.microsoft.com/office/drawing/2010/main" xmlns="" w="9525">
+                  <a14:hiddenLine xmlns="" xmlns:a14="http://schemas.microsoft.com/office/drawing/2010/main" w="9525">
                     <a:solidFill>
                       <a:srgbClr val="000000"/>
                     </a:solidFill>
@@ -11380,7 +11380,7 @@
               </a:ln>
               <a:extLst>
                 <a:ext uri="{91240B29-F687-4f45-9708-019B960494DF}">
-                  <a14:hiddenLine xmlns:a14="http://schemas.microsoft.com/office/drawing/2010/main" xmlns="" w="9525">
+                  <a14:hiddenLine xmlns="" xmlns:a14="http://schemas.microsoft.com/office/drawing/2010/main" w="9525">
                     <a:solidFill>
                       <a:srgbClr val="000000"/>
                     </a:solidFill>
@@ -11470,7 +11470,7 @@
               </a:ln>
               <a:extLst>
                 <a:ext uri="{91240B29-F687-4f45-9708-019B960494DF}">
-                  <a14:hiddenLine xmlns:a14="http://schemas.microsoft.com/office/drawing/2010/main" xmlns="" w="9525">
+                  <a14:hiddenLine xmlns="" xmlns:a14="http://schemas.microsoft.com/office/drawing/2010/main" w="9525">
                     <a:solidFill>
                       <a:srgbClr val="000000"/>
                     </a:solidFill>
@@ -11538,7 +11538,7 @@
               </a:ln>
               <a:extLst>
                 <a:ext uri="{91240B29-F687-4f45-9708-019B960494DF}">
-                  <a14:hiddenLine xmlns:a14="http://schemas.microsoft.com/office/drawing/2010/main" xmlns="" w="9525">
+                  <a14:hiddenLine xmlns="" xmlns:a14="http://schemas.microsoft.com/office/drawing/2010/main" w="9525">
                     <a:solidFill>
                       <a:srgbClr val="000000"/>
                     </a:solidFill>
@@ -11628,7 +11628,7 @@
               </a:ln>
               <a:extLst>
                 <a:ext uri="{91240B29-F687-4f45-9708-019B960494DF}">
-                  <a14:hiddenLine xmlns:a14="http://schemas.microsoft.com/office/drawing/2010/main" xmlns="" w="9525">
+                  <a14:hiddenLine xmlns="" xmlns:a14="http://schemas.microsoft.com/office/drawing/2010/main" w="9525">
                     <a:solidFill>
                       <a:srgbClr val="000000"/>
                     </a:solidFill>
@@ -11696,7 +11696,7 @@
               </a:ln>
               <a:extLst>
                 <a:ext uri="{91240B29-F687-4f45-9708-019B960494DF}">
-                  <a14:hiddenLine xmlns:a14="http://schemas.microsoft.com/office/drawing/2010/main" xmlns="" w="9525">
+                  <a14:hiddenLine xmlns="" xmlns:a14="http://schemas.microsoft.com/office/drawing/2010/main" w="9525">
                     <a:solidFill>
                       <a:srgbClr val="000000"/>
                     </a:solidFill>
@@ -11786,7 +11786,7 @@
               </a:ln>
               <a:extLst>
                 <a:ext uri="{91240B29-F687-4f45-9708-019B960494DF}">
-                  <a14:hiddenLine xmlns:a14="http://schemas.microsoft.com/office/drawing/2010/main" xmlns="" w="9525">
+                  <a14:hiddenLine xmlns="" xmlns:a14="http://schemas.microsoft.com/office/drawing/2010/main" w="9525">
                     <a:solidFill>
                       <a:srgbClr val="000000"/>
                     </a:solidFill>
@@ -11820,7 +11820,7 @@
               </a:ln>
               <a:extLst>
                 <a:ext uri="{91240B29-F687-4f45-9708-019B960494DF}">
-                  <a14:hiddenLine xmlns:a14="http://schemas.microsoft.com/office/drawing/2010/main" xmlns="" w="9525">
+                  <a14:hiddenLine xmlns="" xmlns:a14="http://schemas.microsoft.com/office/drawing/2010/main" w="9525">
                     <a:solidFill>
                       <a:srgbClr val="000000"/>
                     </a:solidFill>
@@ -11961,7 +11961,7 @@
             <a:fld id="{48A87A34-81AB-432B-8DAE-1953F412C126}" type="datetimeFigureOut">
               <a:rPr lang="en-US" dirty="0"/>
               <a:pPr/>
-              <a:t>9/7/2021</a:t>
+              <a:t>9/9/2021</a:t>
             </a:fld>
             <a:endParaRPr lang="en-US" dirty="0"/>
           </a:p>
@@ -12854,7 +12854,6 @@
               <a:rPr lang="en-US" dirty="0"/>
               <a:t>a test container</a:t>
             </a:r>
-            <a:endParaRPr lang="en-US" dirty="0"/>
           </a:p>
         </p:txBody>
       </p:sp>
@@ -13732,12 +13731,139 @@
               <a:t> start </a:t>
             </a:r>
             <a:r>
+              <a:rPr lang="en-US" b="1" i="1" dirty="0" err="1" smtClean="0">
+                <a:solidFill>
+                  <a:srgbClr val="00B0F0"/>
+                </a:solidFill>
+              </a:rPr>
+              <a:t>docker</a:t>
+            </a:r>
+            <a:endParaRPr lang="en-US" b="1" i="1" dirty="0" smtClean="0">
+              <a:solidFill>
+                <a:srgbClr val="00B0F0"/>
+              </a:solidFill>
+            </a:endParaRPr>
+          </a:p>
+          <a:p>
+            <a:pPr marL="0" indent="0">
+              <a:buNone/>
+            </a:pPr>
+            <a:endParaRPr lang="en-US" b="1" i="1" dirty="0">
+              <a:solidFill>
+                <a:srgbClr val="00B0F0"/>
+              </a:solidFill>
+            </a:endParaRPr>
+          </a:p>
+          <a:p>
+            <a:pPr marL="0" indent="0">
+              <a:buNone/>
+            </a:pPr>
+            <a:r>
+              <a:rPr lang="en-US" dirty="0"/>
+              <a:t># setup </a:t>
+            </a:r>
+            <a:r>
+              <a:rPr lang="en-US" dirty="0" err="1"/>
+              <a:t>docker</a:t>
+            </a:r>
+            <a:r>
+              <a:rPr lang="en-US" dirty="0"/>
+              <a:t> to run at boot</a:t>
+            </a:r>
+          </a:p>
+          <a:p>
+            <a:pPr marL="0" indent="0">
+              <a:buNone/>
+            </a:pPr>
+            <a:r>
               <a:rPr lang="en-US" b="1" i="1" dirty="0" err="1">
                 <a:solidFill>
                   <a:srgbClr val="00B0F0"/>
                 </a:solidFill>
               </a:rPr>
-              <a:t>docker</a:t>
+              <a:t>sudo</a:t>
+            </a:r>
+            <a:r>
+              <a:rPr lang="en-US" b="1" i="1" dirty="0">
+                <a:solidFill>
+                  <a:srgbClr val="00B0F0"/>
+                </a:solidFill>
+              </a:rPr>
+              <a:t> </a:t>
+            </a:r>
+            <a:r>
+              <a:rPr lang="en-US" b="1" i="1" dirty="0" err="1">
+                <a:solidFill>
+                  <a:srgbClr val="00B0F0"/>
+                </a:solidFill>
+              </a:rPr>
+              <a:t>systemctl</a:t>
+            </a:r>
+            <a:r>
+              <a:rPr lang="en-US" b="1" i="1" dirty="0">
+                <a:solidFill>
+                  <a:srgbClr val="00B0F0"/>
+                </a:solidFill>
+              </a:rPr>
+              <a:t> enable </a:t>
+            </a:r>
+            <a:r>
+              <a:rPr lang="en-US" b="1" i="1" dirty="0" err="1">
+                <a:solidFill>
+                  <a:srgbClr val="00B0F0"/>
+                </a:solidFill>
+              </a:rPr>
+              <a:t>docker.service</a:t>
+            </a:r>
+            <a:endParaRPr lang="en-US" b="1" i="1" dirty="0">
+              <a:solidFill>
+                <a:srgbClr val="00B0F0"/>
+              </a:solidFill>
+            </a:endParaRPr>
+          </a:p>
+          <a:p>
+            <a:pPr marL="0" indent="0">
+              <a:buNone/>
+            </a:pPr>
+            <a:r>
+              <a:rPr lang="en-US" b="1" i="1" dirty="0" err="1">
+                <a:solidFill>
+                  <a:srgbClr val="00B0F0"/>
+                </a:solidFill>
+              </a:rPr>
+              <a:t>sudo</a:t>
+            </a:r>
+            <a:r>
+              <a:rPr lang="en-US" b="1" i="1" dirty="0">
+                <a:solidFill>
+                  <a:srgbClr val="00B0F0"/>
+                </a:solidFill>
+              </a:rPr>
+              <a:t> </a:t>
+            </a:r>
+            <a:r>
+              <a:rPr lang="en-US" b="1" i="1" dirty="0" err="1">
+                <a:solidFill>
+                  <a:srgbClr val="00B0F0"/>
+                </a:solidFill>
+              </a:rPr>
+              <a:t>systemctl</a:t>
+            </a:r>
+            <a:r>
+              <a:rPr lang="en-US" b="1" i="1" dirty="0">
+                <a:solidFill>
+                  <a:srgbClr val="00B0F0"/>
+                </a:solidFill>
+              </a:rPr>
+              <a:t> enable </a:t>
+            </a:r>
+            <a:r>
+              <a:rPr lang="en-US" b="1" i="1" dirty="0" err="1">
+                <a:solidFill>
+                  <a:srgbClr val="00B0F0"/>
+                </a:solidFill>
+              </a:rPr>
+              <a:t>containerd.service</a:t>
             </a:r>
             <a:endParaRPr lang="en-US" b="1" i="1" dirty="0">
               <a:solidFill>
@@ -13798,7 +13924,6 @@
               <a:rPr lang="en-US" sz="3200" dirty="0"/>
               <a:t>Run a test container</a:t>
             </a:r>
-            <a:endParaRPr lang="en-US" sz="3200" dirty="0"/>
           </a:p>
         </p:txBody>
       </p:sp>
@@ -14809,7 +14934,6 @@
               <a:rPr lang="en-US" sz="3200" dirty="0"/>
               <a:t>Run a test container</a:t>
             </a:r>
-            <a:endParaRPr lang="en-US" sz="3200" dirty="0"/>
           </a:p>
         </p:txBody>
       </p:sp>
@@ -14980,7 +15104,6 @@
               <a:rPr lang="en-US" dirty="0"/>
               <a:t>-compose</a:t>
             </a:r>
-            <a:endParaRPr lang="en-US" dirty="0"/>
           </a:p>
         </p:txBody>
       </p:sp>
@@ -16921,13 +17044,8 @@
           <a:p>
             <a:r>
               <a:rPr lang="en-US" sz="2400" dirty="0" smtClean="0"/>
-              <a:t>Today, </a:t>
-            </a:r>
-            <a:r>
-              <a:rPr lang="en-US" sz="2400" dirty="0" smtClean="0"/>
-              <a:t>we got an overview of what we will be covering during the eight weeks. </a:t>
-            </a:r>
-            <a:endParaRPr lang="en-US" sz="2400" dirty="0" smtClean="0"/>
+              <a:t>Today, we got an overview of what we will be covering during the eight weeks. </a:t>
+            </a:r>
           </a:p>
           <a:p>
             <a:endParaRPr lang="en-US" sz="2400" dirty="0"/>
@@ -16985,7 +17103,6 @@
               <a:rPr lang="en-US" sz="2800" dirty="0" smtClean="0"/>
               <a:t>OS X</a:t>
             </a:r>
-            <a:endParaRPr lang="en-US" sz="2800" dirty="0" smtClean="0"/>
           </a:p>
           <a:p>
             <a:pPr marL="342900" indent="-342900">
@@ -17004,7 +17121,6 @@
               <a:rPr lang="en-US" sz="2800" dirty="0" smtClean="0"/>
               <a:t>some important post install steps</a:t>
             </a:r>
-            <a:endParaRPr lang="en-US" sz="2800" dirty="0" smtClean="0"/>
           </a:p>
           <a:p>
             <a:pPr marL="342900" indent="-342900">
@@ -17015,7 +17131,6 @@
               <a:rPr lang="en-US" sz="2800" dirty="0" smtClean="0"/>
               <a:t>We learned how using Docker on each OS differs</a:t>
             </a:r>
-            <a:endParaRPr lang="en-US" sz="2800" dirty="0" smtClean="0"/>
           </a:p>
           <a:p>
             <a:endParaRPr lang="en-US" sz="2400" dirty="0"/>
@@ -18047,7 +18162,6 @@
               <a:rPr lang="en-US" dirty="0"/>
               <a:t>with CentOS.</a:t>
             </a:r>
-            <a:endParaRPr lang="en-US" dirty="0"/>
           </a:p>
         </p:txBody>
       </p:sp>

</xml_diff>